<commit_message>
use bash to evaluate dicleave
</commit_message>
<xml_diff>
--- a/figures/rocket_convolution.pptx
+++ b/figures/rocket_convolution.pptx
@@ -261,7 +261,7 @@
           <a:p>
             <a:fld id="{BDC8D03D-2AD3-E446-A2F6-CAF9C7D73433}" type="datetimeFigureOut">
               <a:rPr lang="en-US" smtClean="0"/>
-              <a:t>6/24/25</a:t>
+              <a:t>7/2/25</a:t>
             </a:fld>
             <a:endParaRPr lang="en-US"/>
           </a:p>
@@ -461,7 +461,7 @@
           <a:p>
             <a:fld id="{BDC8D03D-2AD3-E446-A2F6-CAF9C7D73433}" type="datetimeFigureOut">
               <a:rPr lang="en-US" smtClean="0"/>
-              <a:t>6/24/25</a:t>
+              <a:t>7/2/25</a:t>
             </a:fld>
             <a:endParaRPr lang="en-US"/>
           </a:p>
@@ -671,7 +671,7 @@
           <a:p>
             <a:fld id="{BDC8D03D-2AD3-E446-A2F6-CAF9C7D73433}" type="datetimeFigureOut">
               <a:rPr lang="en-US" smtClean="0"/>
-              <a:t>6/24/25</a:t>
+              <a:t>7/2/25</a:t>
             </a:fld>
             <a:endParaRPr lang="en-US"/>
           </a:p>
@@ -871,7 +871,7 @@
           <a:p>
             <a:fld id="{BDC8D03D-2AD3-E446-A2F6-CAF9C7D73433}" type="datetimeFigureOut">
               <a:rPr lang="en-US" smtClean="0"/>
-              <a:t>6/24/25</a:t>
+              <a:t>7/2/25</a:t>
             </a:fld>
             <a:endParaRPr lang="en-US"/>
           </a:p>
@@ -1147,7 +1147,7 @@
           <a:p>
             <a:fld id="{BDC8D03D-2AD3-E446-A2F6-CAF9C7D73433}" type="datetimeFigureOut">
               <a:rPr lang="en-US" smtClean="0"/>
-              <a:t>6/24/25</a:t>
+              <a:t>7/2/25</a:t>
             </a:fld>
             <a:endParaRPr lang="en-US"/>
           </a:p>
@@ -1415,7 +1415,7 @@
           <a:p>
             <a:fld id="{BDC8D03D-2AD3-E446-A2F6-CAF9C7D73433}" type="datetimeFigureOut">
               <a:rPr lang="en-US" smtClean="0"/>
-              <a:t>6/24/25</a:t>
+              <a:t>7/2/25</a:t>
             </a:fld>
             <a:endParaRPr lang="en-US"/>
           </a:p>
@@ -1830,7 +1830,7 @@
           <a:p>
             <a:fld id="{BDC8D03D-2AD3-E446-A2F6-CAF9C7D73433}" type="datetimeFigureOut">
               <a:rPr lang="en-US" smtClean="0"/>
-              <a:t>6/24/25</a:t>
+              <a:t>7/2/25</a:t>
             </a:fld>
             <a:endParaRPr lang="en-US"/>
           </a:p>
@@ -1972,7 +1972,7 @@
           <a:p>
             <a:fld id="{BDC8D03D-2AD3-E446-A2F6-CAF9C7D73433}" type="datetimeFigureOut">
               <a:rPr lang="en-US" smtClean="0"/>
-              <a:t>6/24/25</a:t>
+              <a:t>7/2/25</a:t>
             </a:fld>
             <a:endParaRPr lang="en-US"/>
           </a:p>
@@ -2085,7 +2085,7 @@
           <a:p>
             <a:fld id="{BDC8D03D-2AD3-E446-A2F6-CAF9C7D73433}" type="datetimeFigureOut">
               <a:rPr lang="en-US" smtClean="0"/>
-              <a:t>6/24/25</a:t>
+              <a:t>7/2/25</a:t>
             </a:fld>
             <a:endParaRPr lang="en-US"/>
           </a:p>
@@ -2398,7 +2398,7 @@
           <a:p>
             <a:fld id="{BDC8D03D-2AD3-E446-A2F6-CAF9C7D73433}" type="datetimeFigureOut">
               <a:rPr lang="en-US" smtClean="0"/>
-              <a:t>6/24/25</a:t>
+              <a:t>7/2/25</a:t>
             </a:fld>
             <a:endParaRPr lang="en-US"/>
           </a:p>
@@ -2687,7 +2687,7 @@
           <a:p>
             <a:fld id="{BDC8D03D-2AD3-E446-A2F6-CAF9C7D73433}" type="datetimeFigureOut">
               <a:rPr lang="en-US" smtClean="0"/>
-              <a:t>6/24/25</a:t>
+              <a:t>7/2/25</a:t>
             </a:fld>
             <a:endParaRPr lang="en-US"/>
           </a:p>
@@ -2930,7 +2930,7 @@
           <a:p>
             <a:fld id="{BDC8D03D-2AD3-E446-A2F6-CAF9C7D73433}" type="datetimeFigureOut">
               <a:rPr lang="en-US" smtClean="0"/>
-              <a:t>6/24/25</a:t>
+              <a:t>7/2/25</a:t>
             </a:fld>
             <a:endParaRPr lang="en-US"/>
           </a:p>
@@ -4488,7 +4488,7 @@
         <p:spPr>
           <a:xfrm>
             <a:off x="1437115" y="3941076"/>
-            <a:ext cx="1034257" cy="369332"/>
+            <a:ext cx="1149674" cy="369332"/>
           </a:xfrm>
           <a:prstGeom prst="rect">
             <a:avLst/>
@@ -4516,11 +4516,14 @@
               </a:rPr>
               <a:t>ω</a:t>
             </a:r>
-            <a:endParaRPr lang="en-US" b="0" i="1" dirty="0">
-              <a:effectLst/>
-              <a:latin typeface="Times New Roman" panose="02020603050405020304" pitchFamily="18" charset="0"/>
-              <a:cs typeface="Times New Roman" panose="02020603050405020304" pitchFamily="18" charset="0"/>
-            </a:endParaRPr>
+            <a:r>
+              <a:rPr lang="en-US" b="0" i="1" baseline="-25000" dirty="0">
+                <a:effectLst/>
+                <a:latin typeface="Times New Roman" panose="02020603050405020304" pitchFamily="18" charset="0"/>
+                <a:cs typeface="Times New Roman" panose="02020603050405020304" pitchFamily="18" charset="0"/>
+              </a:rPr>
+              <a:t>1</a:t>
+            </a:r>
           </a:p>
         </p:txBody>
       </p:sp>
@@ -5336,7 +5339,7 @@
         <p:spPr>
           <a:xfrm>
             <a:off x="3727800" y="4530122"/>
-            <a:ext cx="1099981" cy="369332"/>
+            <a:ext cx="1215397" cy="369332"/>
           </a:xfrm>
           <a:prstGeom prst="rect">
             <a:avLst/>
@@ -5371,7 +5374,15 @@
               </a:rPr>
               <a:t>ω</a:t>
             </a:r>
-            <a:endParaRPr lang="en-US" dirty="0">
+            <a:r>
+              <a:rPr lang="en-US" b="0" i="1" baseline="-25000" dirty="0">
+                <a:effectLst/>
+                <a:latin typeface="Times New Roman" panose="02020603050405020304" pitchFamily="18" charset="0"/>
+                <a:cs typeface="Times New Roman" panose="02020603050405020304" pitchFamily="18" charset="0"/>
+              </a:rPr>
+              <a:t>1</a:t>
+            </a:r>
+            <a:endParaRPr lang="en-US" baseline="-25000" dirty="0">
               <a:latin typeface="Times New Roman" panose="02020603050405020304" pitchFamily="18" charset="0"/>
               <a:cs typeface="Times New Roman" panose="02020603050405020304" pitchFamily="18" charset="0"/>
             </a:endParaRPr>
@@ -5910,7 +5921,7 @@
         <p:spPr>
           <a:xfrm>
             <a:off x="4317080" y="1727828"/>
-            <a:ext cx="1088760" cy="369332"/>
+            <a:ext cx="1204176" cy="369332"/>
           </a:xfrm>
           <a:prstGeom prst="rect">
             <a:avLst/>
@@ -5945,7 +5956,15 @@
               </a:rPr>
               <a:t>ω</a:t>
             </a:r>
-            <a:endParaRPr lang="en-US" dirty="0">
+            <a:r>
+              <a:rPr lang="en-US" b="0" i="1" baseline="-25000" dirty="0">
+                <a:effectLst/>
+                <a:latin typeface="Times New Roman" panose="02020603050405020304" pitchFamily="18" charset="0"/>
+                <a:cs typeface="Times New Roman" panose="02020603050405020304" pitchFamily="18" charset="0"/>
+              </a:rPr>
+              <a:t>2</a:t>
+            </a:r>
+            <a:endParaRPr lang="en-US" baseline="-25000" dirty="0">
               <a:latin typeface="Times New Roman" panose="02020603050405020304" pitchFamily="18" charset="0"/>
               <a:cs typeface="Times New Roman" panose="02020603050405020304" pitchFamily="18" charset="0"/>
             </a:endParaRPr>
@@ -7213,7 +7232,7 @@
         <p:spPr>
           <a:xfrm>
             <a:off x="7889702" y="1727828"/>
-            <a:ext cx="1195584" cy="369332"/>
+            <a:ext cx="1311000" cy="369332"/>
           </a:xfrm>
           <a:prstGeom prst="rect">
             <a:avLst/>
@@ -7248,7 +7267,15 @@
               </a:rPr>
               <a:t>ω</a:t>
             </a:r>
-            <a:endParaRPr lang="en-US" dirty="0">
+            <a:r>
+              <a:rPr lang="en-US" b="0" i="1" baseline="-25000" dirty="0">
+                <a:effectLst/>
+                <a:latin typeface="Times New Roman" panose="02020603050405020304" pitchFamily="18" charset="0"/>
+                <a:cs typeface="Times New Roman" panose="02020603050405020304" pitchFamily="18" charset="0"/>
+              </a:rPr>
+              <a:t>2</a:t>
+            </a:r>
+            <a:endParaRPr lang="en-US" baseline="-25000" dirty="0">
               <a:latin typeface="Times New Roman" panose="02020603050405020304" pitchFamily="18" charset="0"/>
               <a:cs typeface="Times New Roman" panose="02020603050405020304" pitchFamily="18" charset="0"/>
             </a:endParaRPr>
@@ -7675,7 +7702,7 @@
         <p:spPr>
           <a:xfrm>
             <a:off x="8464202" y="4537457"/>
-            <a:ext cx="1206805" cy="369332"/>
+            <a:ext cx="1322221" cy="369332"/>
           </a:xfrm>
           <a:prstGeom prst="rect">
             <a:avLst/>
@@ -7710,7 +7737,15 @@
               </a:rPr>
               <a:t>ω</a:t>
             </a:r>
-            <a:endParaRPr lang="en-US" dirty="0">
+            <a:r>
+              <a:rPr lang="en-US" b="0" i="1" baseline="-25000" dirty="0">
+                <a:effectLst/>
+                <a:latin typeface="Times New Roman" panose="02020603050405020304" pitchFamily="18" charset="0"/>
+                <a:cs typeface="Times New Roman" panose="02020603050405020304" pitchFamily="18" charset="0"/>
+              </a:rPr>
+              <a:t>1</a:t>
+            </a:r>
+            <a:endParaRPr lang="en-US" baseline="-25000" dirty="0">
               <a:latin typeface="Times New Roman" panose="02020603050405020304" pitchFamily="18" charset="0"/>
               <a:cs typeface="Times New Roman" panose="02020603050405020304" pitchFamily="18" charset="0"/>
             </a:endParaRPr>
@@ -7732,7 +7767,7 @@
         <p:spPr>
           <a:xfrm>
             <a:off x="1437115" y="2052804"/>
-            <a:ext cx="1034257" cy="369332"/>
+            <a:ext cx="1111202" cy="369332"/>
           </a:xfrm>
           <a:prstGeom prst="rect">
             <a:avLst/>
@@ -7760,7 +7795,14 @@
               </a:rPr>
               <a:t>ω</a:t>
             </a:r>
-            <a:endParaRPr lang="en-US" b="0" i="1" dirty="0">
+            <a:r>
+              <a:rPr lang="en-US" i="1" baseline="-25000" dirty="0">
+                <a:latin typeface="Times New Roman" panose="02020603050405020304" pitchFamily="18" charset="0"/>
+                <a:cs typeface="Times New Roman" panose="02020603050405020304" pitchFamily="18" charset="0"/>
+              </a:rPr>
+              <a:t>2</a:t>
+            </a:r>
+            <a:endParaRPr lang="en-US" b="0" i="1" baseline="-25000" dirty="0">
               <a:effectLst/>
               <a:latin typeface="Times New Roman" panose="02020603050405020304" pitchFamily="18" charset="0"/>
               <a:cs typeface="Times New Roman" panose="02020603050405020304" pitchFamily="18" charset="0"/>

</xml_diff>